<commit_message>
model update and data analysis
did model update to V3.3 (minor tweaks) and started analysis of kinetics
</commit_message>
<xml_diff>
--- a/3D model/version logs and observations/Changelogs for Chamber for AutoCIF.pptx
+++ b/3D model/version logs and observations/Changelogs for Chamber for AutoCIF.pptx
@@ -262,7 +262,7 @@
           <a:p>
             <a:fld id="{0715C836-0CB0-4822-8DB8-6FE3E0F9AFC9}" type="datetimeFigureOut">
               <a:rPr lang="en-US" smtClean="0"/>
-              <a:t>6/27/2022</a:t>
+              <a:t>6/29/2022</a:t>
             </a:fld>
             <a:endParaRPr lang="en-US"/>
           </a:p>
@@ -460,7 +460,7 @@
           <a:p>
             <a:fld id="{0715C836-0CB0-4822-8DB8-6FE3E0F9AFC9}" type="datetimeFigureOut">
               <a:rPr lang="en-US" smtClean="0"/>
-              <a:t>6/27/2022</a:t>
+              <a:t>6/29/2022</a:t>
             </a:fld>
             <a:endParaRPr lang="en-US"/>
           </a:p>
@@ -668,7 +668,7 @@
           <a:p>
             <a:fld id="{0715C836-0CB0-4822-8DB8-6FE3E0F9AFC9}" type="datetimeFigureOut">
               <a:rPr lang="en-US" smtClean="0"/>
-              <a:t>6/27/2022</a:t>
+              <a:t>6/29/2022</a:t>
             </a:fld>
             <a:endParaRPr lang="en-US"/>
           </a:p>
@@ -866,7 +866,7 @@
           <a:p>
             <a:fld id="{0715C836-0CB0-4822-8DB8-6FE3E0F9AFC9}" type="datetimeFigureOut">
               <a:rPr lang="en-US" smtClean="0"/>
-              <a:t>6/27/2022</a:t>
+              <a:t>6/29/2022</a:t>
             </a:fld>
             <a:endParaRPr lang="en-US"/>
           </a:p>
@@ -1141,7 +1141,7 @@
           <a:p>
             <a:fld id="{0715C836-0CB0-4822-8DB8-6FE3E0F9AFC9}" type="datetimeFigureOut">
               <a:rPr lang="en-US" smtClean="0"/>
-              <a:t>6/27/2022</a:t>
+              <a:t>6/29/2022</a:t>
             </a:fld>
             <a:endParaRPr lang="en-US"/>
           </a:p>
@@ -1406,7 +1406,7 @@
           <a:p>
             <a:fld id="{0715C836-0CB0-4822-8DB8-6FE3E0F9AFC9}" type="datetimeFigureOut">
               <a:rPr lang="en-US" smtClean="0"/>
-              <a:t>6/27/2022</a:t>
+              <a:t>6/29/2022</a:t>
             </a:fld>
             <a:endParaRPr lang="en-US"/>
           </a:p>
@@ -1818,7 +1818,7 @@
           <a:p>
             <a:fld id="{0715C836-0CB0-4822-8DB8-6FE3E0F9AFC9}" type="datetimeFigureOut">
               <a:rPr lang="en-US" smtClean="0"/>
-              <a:t>6/27/2022</a:t>
+              <a:t>6/29/2022</a:t>
             </a:fld>
             <a:endParaRPr lang="en-US"/>
           </a:p>
@@ -1959,7 +1959,7 @@
           <a:p>
             <a:fld id="{0715C836-0CB0-4822-8DB8-6FE3E0F9AFC9}" type="datetimeFigureOut">
               <a:rPr lang="en-US" smtClean="0"/>
-              <a:t>6/27/2022</a:t>
+              <a:t>6/29/2022</a:t>
             </a:fld>
             <a:endParaRPr lang="en-US"/>
           </a:p>
@@ -2072,7 +2072,7 @@
           <a:p>
             <a:fld id="{0715C836-0CB0-4822-8DB8-6FE3E0F9AFC9}" type="datetimeFigureOut">
               <a:rPr lang="en-US" smtClean="0"/>
-              <a:t>6/27/2022</a:t>
+              <a:t>6/29/2022</a:t>
             </a:fld>
             <a:endParaRPr lang="en-US"/>
           </a:p>
@@ -2383,7 +2383,7 @@
           <a:p>
             <a:fld id="{0715C836-0CB0-4822-8DB8-6FE3E0F9AFC9}" type="datetimeFigureOut">
               <a:rPr lang="en-US" smtClean="0"/>
-              <a:t>6/27/2022</a:t>
+              <a:t>6/29/2022</a:t>
             </a:fld>
             <a:endParaRPr lang="en-US"/>
           </a:p>
@@ -2671,7 +2671,7 @@
           <a:p>
             <a:fld id="{0715C836-0CB0-4822-8DB8-6FE3E0F9AFC9}" type="datetimeFigureOut">
               <a:rPr lang="en-US" smtClean="0"/>
-              <a:t>6/27/2022</a:t>
+              <a:t>6/29/2022</a:t>
             </a:fld>
             <a:endParaRPr lang="en-US"/>
           </a:p>
@@ -2912,7 +2912,7 @@
           <a:p>
             <a:fld id="{0715C836-0CB0-4822-8DB8-6FE3E0F9AFC9}" type="datetimeFigureOut">
               <a:rPr lang="en-US" smtClean="0"/>
-              <a:t>6/27/2022</a:t>
+              <a:t>6/29/2022</a:t>
             </a:fld>
             <a:endParaRPr lang="en-US"/>
           </a:p>
@@ -3428,7 +3428,12 @@
             <p:ph type="title"/>
           </p:nvPr>
         </p:nvSpPr>
-        <p:spPr/>
+        <p:spPr>
+          <a:xfrm>
+            <a:off x="754310" y="-62714"/>
+            <a:ext cx="10515600" cy="1325563"/>
+          </a:xfrm>
+        </p:spPr>
         <p:txBody>
           <a:bodyPr/>
           <a:lstStyle/>
@@ -3772,6 +3777,44 @@
           </a:p>
           <a:p>
             <a:endParaRPr lang="en-US" sz="2000" dirty="0"/>
+          </a:p>
+        </p:txBody>
+      </p:sp>
+      <p:sp>
+        <p:nvSpPr>
+          <p:cNvPr id="4" name="TextBox 3">
+            <a:extLst>
+              <a:ext uri="{FF2B5EF4-FFF2-40B4-BE49-F238E27FC236}">
+                <a16:creationId xmlns:a16="http://schemas.microsoft.com/office/drawing/2014/main" id="{12FD0138-DB0B-C684-948F-36BADE7F5F11}"/>
+              </a:ext>
+            </a:extLst>
+          </p:cNvPr>
+          <p:cNvSpPr txBox="1"/>
+          <p:nvPr/>
+        </p:nvSpPr>
+        <p:spPr>
+          <a:xfrm>
+            <a:off x="1661020" y="939683"/>
+            <a:ext cx="1632883" cy="646331"/>
+          </a:xfrm>
+          <a:prstGeom prst="rect">
+            <a:avLst/>
+          </a:prstGeom>
+          <a:noFill/>
+        </p:spPr>
+        <p:txBody>
+          <a:bodyPr wrap="none" rtlCol="0">
+            <a:spAutoFit/>
+          </a:bodyPr>
+          <a:lstStyle/>
+          <a:p>
+            <a:r>
+              <a:rPr lang="en-US" dirty="0"/>
+              <a:t>General tweaks</a:t>
+            </a:r>
+          </a:p>
+          <a:p>
+            <a:endParaRPr lang="en-US" dirty="0"/>
           </a:p>
         </p:txBody>
       </p:sp>

</xml_diff>